<commit_message>
CSC 102 CLASS PROJECT 2
</commit_message>
<xml_diff>
--- a/CSC 102 CLASS PROJECT 1.pptx
+++ b/CSC 102 CLASS PROJECT 1.pptx
@@ -4189,7 +4189,7 @@
         </p:blipFill>
         <p:spPr bwMode="auto">
           <a:xfrm>
-            <a:off x="0" y="152400"/>
+            <a:off x="0" y="304800"/>
             <a:ext cx="12192000" cy="6476999"/>
           </a:xfrm>
           <a:prstGeom prst="rect">
@@ -4207,6 +4207,72 @@
           </a:extLst>
         </p:spPr>
       </p:pic>
+      <p:cxnSp>
+        <p:nvCxnSpPr>
+          <p:cNvPr id="4" name="Straight Arrow Connector 3"/>
+          <p:cNvCxnSpPr/>
+          <p:nvPr/>
+        </p:nvCxnSpPr>
+        <p:spPr>
+          <a:xfrm flipH="1">
+            <a:off x="1981200" y="3276600"/>
+            <a:ext cx="2743200" cy="0"/>
+          </a:xfrm>
+          <a:prstGeom prst="straightConnector1">
+            <a:avLst/>
+          </a:prstGeom>
+          <a:ln>
+            <a:tailEnd type="triangle"/>
+          </a:ln>
+        </p:spPr>
+        <p:style>
+          <a:lnRef idx="1">
+            <a:schemeClr val="dk1"/>
+          </a:lnRef>
+          <a:fillRef idx="0">
+            <a:schemeClr val="dk1"/>
+          </a:fillRef>
+          <a:effectRef idx="0">
+            <a:schemeClr val="dk1"/>
+          </a:effectRef>
+          <a:fontRef idx="minor">
+            <a:schemeClr val="tx1"/>
+          </a:fontRef>
+        </p:style>
+      </p:cxnSp>
+      <p:cxnSp>
+        <p:nvCxnSpPr>
+          <p:cNvPr id="8" name="Straight Arrow Connector 7"/>
+          <p:cNvCxnSpPr/>
+          <p:nvPr/>
+        </p:nvCxnSpPr>
+        <p:spPr>
+          <a:xfrm flipV="1">
+            <a:off x="1981200" y="1981200"/>
+            <a:ext cx="0" cy="1295400"/>
+          </a:xfrm>
+          <a:prstGeom prst="straightConnector1">
+            <a:avLst/>
+          </a:prstGeom>
+          <a:ln>
+            <a:tailEnd type="triangle"/>
+          </a:ln>
+        </p:spPr>
+        <p:style>
+          <a:lnRef idx="1">
+            <a:schemeClr val="dk1"/>
+          </a:lnRef>
+          <a:fillRef idx="0">
+            <a:schemeClr val="dk1"/>
+          </a:fillRef>
+          <a:effectRef idx="0">
+            <a:schemeClr val="dk1"/>
+          </a:effectRef>
+          <a:fontRef idx="minor">
+            <a:schemeClr val="tx1"/>
+          </a:fontRef>
+        </p:style>
+      </p:cxnSp>
     </p:spTree>
     <p:extLst>
       <p:ext uri="{BB962C8B-B14F-4D97-AF65-F5344CB8AC3E}">

</xml_diff>